<commit_message>
start convolutional neural network study pack
</commit_message>
<xml_diff>
--- a/workshops/Neural_Networks/The Idiomatic Programmer - Learning Keras - Workshop - Neural Networks.pptx
+++ b/workshops/Neural_Networks/The Idiomatic Programmer - Learning Keras - Workshop - Neural Networks.pptx
@@ -10137,7 +10137,34 @@
                   <a:schemeClr val="dk1"/>
                 </a:solidFill>
               </a:rPr>
-              <a:t>Deep Learning, Deep, Deep, Deep. What's this? It just means that the neural network has one or more layers between the input layer and the output layer. Visualize a directed graph in layers of depth. The root nodes are the input layer and the terminal nodes are the output layer. The layers in between are known as the hidden (deep) layers. That's it. A four layer DNN would look like:</a:t>
+              <a:t>What's meant by Deep? It just means that the neural network has one or more layers between the input layer and the output layer. Visualize a directed graph in layers of depth. The root nodes are the input layer and the terminal nodes are the output layer. The layers in between are known as the hidden (deep) layers. </a:t>
+            </a:r>
+            <a:endParaRPr sz="1200">
+              <a:solidFill>
+                <a:schemeClr val="dk1"/>
+              </a:solidFill>
+            </a:endParaRPr>
+          </a:p>
+          <a:p>
+            <a:pPr indent="0" lvl="0" marL="0" rtl="0" algn="l">
+              <a:lnSpc>
+                <a:spcPct val="115000"/>
+              </a:lnSpc>
+              <a:spcBef>
+                <a:spcPts val="1100"/>
+              </a:spcBef>
+              <a:spcAft>
+                <a:spcPts val="0"/>
+              </a:spcAft>
+              <a:buNone/>
+            </a:pPr>
+            <a:r>
+              <a:rPr lang="en" sz="1200">
+                <a:solidFill>
+                  <a:schemeClr val="dk1"/>
+                </a:solidFill>
+              </a:rPr>
+              <a:t>A four layer DNN would look like:</a:t>
             </a:r>
             <a:endParaRPr sz="1200">
               <a:solidFill>
@@ -10289,31 +10316,6 @@
               </a:rPr>
               <a:t>						output layer</a:t>
             </a:r>
-            <a:endParaRPr sz="1200">
-              <a:solidFill>
-                <a:srgbClr val="0000FF"/>
-              </a:solidFill>
-              <a:highlight>
-                <a:srgbClr val="FFFFFF"/>
-              </a:highlight>
-            </a:endParaRPr>
-          </a:p>
-          <a:p>
-            <a:pPr indent="0" lvl="0" marL="0" rtl="0" algn="l">
-              <a:lnSpc>
-                <a:spcPct val="115000"/>
-              </a:lnSpc>
-              <a:spcBef>
-                <a:spcPts val="0"/>
-              </a:spcBef>
-              <a:spcAft>
-                <a:spcPts val="0"/>
-              </a:spcAft>
-              <a:buNone/>
-            </a:pPr>
-            <a:r>
-              <a:t/>
-            </a:r>
             <a:endParaRPr b="1" sz="1200">
               <a:solidFill>
                 <a:schemeClr val="dk1"/>
@@ -10339,7 +10341,7 @@
                   <a:schemeClr val="dk1"/>
                 </a:solidFill>
               </a:rPr>
-              <a:t>For our purposes, we will start with every node in every layer, except the output layer, is the same type of node. And that every node on each layer is connected to every other node on the next layer. This is known as a fully connected neural network (FCNN)</a:t>
+              <a:t>For our purposes, we will start every node on each layer is connected to every other node on the next layer. This is known as a fully connected neural network (FCNN)</a:t>
             </a:r>
             <a:endParaRPr sz="1200">
               <a:solidFill>
@@ -10855,7 +10857,7 @@
                   <a:schemeClr val="dk1"/>
                 </a:solidFill>
               </a:rPr>
-              <a:t>The DNN (and CNN) are known as feed forward neural networks. This means that data moves through the network sequential in one direction (from input to output layer). That's like a function in procedural programming. The inputs are passed as parameters (i.e., input layer), the function performs a sequenced set of actions based on the inputs (i.e., hidden layers) and outputs a result (i.e., output layer).</a:t>
+              <a:t>A DNN (and CNN) are known as feed forward neural networks. This means that data moves through the network sequential in one direction (from input to output layer). That's like a function in procedural programming. The inputs are passed as parameters (i.e., input layer), the function performs a sequenced set of actions based on the inputs (i.e., hidden layers) and outputs a result (i.e., output layer).</a:t>
             </a:r>
             <a:endParaRPr sz="1200">
               <a:solidFill>
@@ -11162,7 +11164,7 @@
                   <a:schemeClr val="dk1"/>
                 </a:solidFill>
               </a:rPr>
-              <a:t> API method is easier to read and follow for beginners, but the trade off is its less flexible. Essentially, you create an empty forward feed neural network with the </a:t>
+              <a:t> API method is easier to read and follow for beginners, but less flexible. Essentially, you create an empty forward feed neural network with the </a:t>
             </a:r>
             <a:r>
               <a:rPr lang="en" sz="1200">
@@ -11255,7 +11257,7 @@
             <a:tbl>
               <a:tblPr>
                 <a:noFill/>
-                <a:tableStyleId>{FCAAA6F9-5CDA-4634-9557-80530CD96CF1}</a:tableStyleId>
+                <a:tableStyleId>{598113E7-8056-45F2-96DC-6926265A21D5}</a:tableStyleId>
               </a:tblPr>
               <a:tblGrid>
                 <a:gridCol w="4214100"/>
@@ -11980,7 +11982,26 @@
                   <a:schemeClr val="dk1"/>
                 </a:solidFill>
               </a:rPr>
-              <a:t>The layers in the neural network may alternately be specified as a list in a sequential order which is passed as a parameter when instantiating the Sequential class object.</a:t>
+              <a:t>The layers in the neural network may alternately be specified as a list in a sequential order which is passed as a parameter when instantiating the </a:t>
+            </a:r>
+            <a:r>
+              <a:rPr lang="en" sz="1200">
+                <a:solidFill>
+                  <a:schemeClr val="dk1"/>
+                </a:solidFill>
+                <a:highlight>
+                  <a:srgbClr val="EFF0F1"/>
+                </a:highlight>
+              </a:rPr>
+              <a:t>Sequential</a:t>
+            </a:r>
+            <a:r>
+              <a:rPr lang="en" sz="1200">
+                <a:solidFill>
+                  <a:schemeClr val="dk1"/>
+                </a:solidFill>
+              </a:rPr>
+              <a:t> class object.</a:t>
             </a:r>
             <a:endParaRPr sz="1200">
               <a:solidFill>
@@ -12054,7 +12075,7 @@
             <a:tbl>
               <a:tblPr>
                 <a:noFill/>
-                <a:tableStyleId>{FCAAA6F9-5CDA-4634-9557-80530CD96CF1}</a:tableStyleId>
+                <a:tableStyleId>{598113E7-8056-45F2-96DC-6926265A21D5}</a:tableStyleId>
               </a:tblPr>
               <a:tblGrid>
                 <a:gridCol w="4214100"/>
@@ -12593,7 +12614,7 @@
             <a:tbl>
               <a:tblPr>
                 <a:noFill/>
-                <a:tableStyleId>{FCAAA6F9-5CDA-4634-9557-80530CD96CF1}</a:tableStyleId>
+                <a:tableStyleId>{598113E7-8056-45F2-96DC-6926265A21D5}</a:tableStyleId>
               </a:tblPr>
               <a:tblGrid>
                 <a:gridCol w="5921325"/>
@@ -13397,10 +13418,33 @@
             </a:r>
             <a:r>
               <a:rPr lang="en" sz="1200"/>
-              <a:t> API approach is more advanced. You build the layers separately and then "tie" them together. This latter step gives you the freedom to connect layers in creative ways. Essentially, for a forward feed neural network, you create the layers, bind them to another layer(s), and then pull all the layers together in a final instantiation of a </a:t>
-            </a:r>
-            <a:r>
-              <a:rPr lang="en" sz="1200">
+              <a:t> API approach is more advanced. You build the layers separately and then "tie" them together. This latter step gives you the freedom to connect layers in creative ways. </a:t>
+            </a:r>
+            <a:endParaRPr sz="1200"/>
+          </a:p>
+          <a:p>
+            <a:pPr indent="0" lvl="0" marL="0" rtl="0" algn="l">
+              <a:lnSpc>
+                <a:spcPct val="115000"/>
+              </a:lnSpc>
+              <a:spcBef>
+                <a:spcPts val="1100"/>
+              </a:spcBef>
+              <a:spcAft>
+                <a:spcPts val="0"/>
+              </a:spcAft>
+              <a:buNone/>
+            </a:pPr>
+            <a:r>
+              <a:rPr lang="en" sz="1200"/>
+              <a:t>Essentially, for a forward feed neural network, you create the layers, bind them to another layer(s), and then </a:t>
+            </a:r>
+            <a:r>
+              <a:rPr lang="en" sz="1200" u="sng"/>
+              <a:t>pull all the layers together in a final instantiation of a </a:t>
+            </a:r>
+            <a:r>
+              <a:rPr lang="en" sz="1200" u="sng">
                 <a:highlight>
                   <a:srgbClr val="EFF0F1"/>
                 </a:highlight>
@@ -13408,8 +13452,12 @@
               <a:t>Model</a:t>
             </a:r>
             <a:r>
+              <a:rPr lang="en" sz="1200" u="sng"/>
+              <a:t> class object</a:t>
+            </a:r>
+            <a:r>
               <a:rPr lang="en" sz="1200"/>
-              <a:t> class object.</a:t>
+              <a:t>.</a:t>
             </a:r>
             <a:br>
               <a:rPr lang="en" sz="1050"/>
@@ -13586,7 +13634,34 @@
                   <a:schemeClr val="dk1"/>
                 </a:solidFill>
               </a:rPr>
-              <a:t>The input shape and input layer can be confusing at first. They are not the same thing. More specifically, the number of nodes in the input layer does not need to match the shape of the input vector. That's because every element in the input vector will be passed to every node in the input layer. </a:t>
+              <a:t>The input shape and input layer are not the same thing. The number of nodes in the input layer does not need to match the shape of the input vector. </a:t>
+            </a:r>
+            <a:endParaRPr sz="1200">
+              <a:solidFill>
+                <a:schemeClr val="dk1"/>
+              </a:solidFill>
+            </a:endParaRPr>
+          </a:p>
+          <a:p>
+            <a:pPr indent="0" lvl="0" marL="0" rtl="0" algn="l">
+              <a:lnSpc>
+                <a:spcPct val="115000"/>
+              </a:lnSpc>
+              <a:spcBef>
+                <a:spcPts val="1100"/>
+              </a:spcBef>
+              <a:spcAft>
+                <a:spcPts val="0"/>
+              </a:spcAft>
+              <a:buNone/>
+            </a:pPr>
+            <a:r>
+              <a:rPr lang="en" sz="1200">
+                <a:solidFill>
+                  <a:schemeClr val="dk1"/>
+                </a:solidFill>
+              </a:rPr>
+              <a:t>Every element in the input vector will be passed to every node in the input layer. </a:t>
             </a:r>
             <a:endParaRPr sz="1200">
               <a:solidFill>
@@ -14531,7 +14606,7 @@
             <a:tbl>
               <a:tblPr>
                 <a:noFill/>
-                <a:tableStyleId>{FCAAA6F9-5CDA-4634-9557-80530CD96CF1}</a:tableStyleId>
+                <a:tableStyleId>{598113E7-8056-45F2-96DC-6926265A21D5}</a:tableStyleId>
               </a:tblPr>
               <a:tblGrid>
                 <a:gridCol w="7136025"/>
@@ -15543,7 +15618,7 @@
             <a:tbl>
               <a:tblPr>
                 <a:noFill/>
-                <a:tableStyleId>{FCAAA6F9-5CDA-4634-9557-80530CD96CF1}</a:tableStyleId>
+                <a:tableStyleId>{598113E7-8056-45F2-96DC-6926265A21D5}</a:tableStyleId>
               </a:tblPr>
               <a:tblGrid>
                 <a:gridCol w="7136025"/>
@@ -16695,10 +16770,10 @@
                   <a:schemeClr val="dk1"/>
                 </a:solidFill>
               </a:rPr>
-              <a:t>Let's now do the same using the layers method. We start by creating an input vector by instantiating a </a:t>
-            </a:r>
-            <a:r>
-              <a:rPr b="1" lang="en" sz="1200">
+              <a:t>Let's now do the same using the </a:t>
+            </a:r>
+            <a:r>
+              <a:rPr lang="en" sz="1200">
                 <a:solidFill>
                   <a:schemeClr val="dk1"/>
                 </a:solidFill>
@@ -16706,6 +16781,25 @@
                   <a:srgbClr val="EFF0F1"/>
                 </a:highlight>
               </a:rPr>
+              <a:t>Functional</a:t>
+            </a:r>
+            <a:r>
+              <a:rPr lang="en" sz="1200">
+                <a:solidFill>
+                  <a:schemeClr val="dk1"/>
+                </a:solidFill>
+              </a:rPr>
+              <a:t> API method. We start by creating an input vector by instantiating a </a:t>
+            </a:r>
+            <a:r>
+              <a:rPr b="1" lang="en" sz="1200">
+                <a:solidFill>
+                  <a:schemeClr val="dk1"/>
+                </a:solidFill>
+                <a:highlight>
+                  <a:srgbClr val="EFF0F1"/>
+                </a:highlight>
+              </a:rPr>
               <a:t>Input()</a:t>
             </a:r>
             <a:r>
@@ -16714,7 +16808,56 @@
                   <a:schemeClr val="dk1"/>
                 </a:solidFill>
               </a:rPr>
-              <a:t> class object. The (positional) parameter to the </a:t>
+              <a:t> class object. </a:t>
+            </a:r>
+            <a:endParaRPr sz="1200">
+              <a:solidFill>
+                <a:schemeClr val="dk1"/>
+              </a:solidFill>
+            </a:endParaRPr>
+          </a:p>
+          <a:p>
+            <a:pPr indent="0" lvl="0" marL="0" rtl="0" algn="l">
+              <a:lnSpc>
+                <a:spcPct val="115000"/>
+              </a:lnSpc>
+              <a:spcBef>
+                <a:spcPts val="0"/>
+              </a:spcBef>
+              <a:spcAft>
+                <a:spcPts val="0"/>
+              </a:spcAft>
+              <a:buNone/>
+            </a:pPr>
+            <a:r>
+              <a:t/>
+            </a:r>
+            <a:endParaRPr sz="1200">
+              <a:solidFill>
+                <a:schemeClr val="dk1"/>
+              </a:solidFill>
+            </a:endParaRPr>
+          </a:p>
+          <a:p>
+            <a:pPr indent="0" lvl="0" marL="0" rtl="0" algn="l">
+              <a:lnSpc>
+                <a:spcPct val="115000"/>
+              </a:lnSpc>
+              <a:spcBef>
+                <a:spcPts val="0"/>
+              </a:spcBef>
+              <a:spcAft>
+                <a:spcPts val="0"/>
+              </a:spcAft>
+              <a:buNone/>
+            </a:pPr>
+            <a:r>
+              <a:rPr lang="en" sz="1200">
+                <a:solidFill>
+                  <a:schemeClr val="dk1"/>
+                </a:solidFill>
+              </a:rPr>
+              <a:t>The (positional) parameter to the </a:t>
             </a:r>
             <a:r>
               <a:rPr lang="en" sz="1200">
@@ -16802,7 +16945,7 @@
             <a:tbl>
               <a:tblPr>
                 <a:noFill/>
-                <a:tableStyleId>{FCAAA6F9-5CDA-4634-9557-80530CD96CF1}</a:tableStyleId>
+                <a:tableStyleId>{598113E7-8056-45F2-96DC-6926265A21D5}</a:tableStyleId>
               </a:tblPr>
               <a:tblGrid>
                 <a:gridCol w="5248275"/>
@@ -17285,7 +17428,7 @@
                   <a:schemeClr val="dk1"/>
                 </a:solidFill>
               </a:rPr>
-              <a:t>Next, we create the input layer by instantiating a</a:t>
+              <a:t>We create the input layer by instantiating a</a:t>
             </a:r>
             <a:r>
               <a:rPr b="1" lang="en" sz="1200">
@@ -17393,7 +17536,7 @@
                   <a:schemeClr val="dk1"/>
                 </a:solidFill>
               </a:rPr>
-              <a:t>. That is, the object returned by instantiating the </a:t>
+              <a:t>. -- the object returned by instantiating the </a:t>
             </a:r>
             <a:r>
               <a:rPr lang="en" sz="1200">
@@ -17522,7 +17665,7 @@
             <a:tbl>
               <a:tblPr>
                 <a:noFill/>
-                <a:tableStyleId>{FCAAA6F9-5CDA-4634-9557-80530CD96CF1}</a:tableStyleId>
+                <a:tableStyleId>{598113E7-8056-45F2-96DC-6926265A21D5}</a:tableStyleId>
               </a:tblPr>
               <a:tblGrid>
                 <a:gridCol w="7070100"/>
@@ -18337,7 +18480,7 @@
                   <a:schemeClr val="dk1"/>
                 </a:solidFill>
               </a:rPr>
-              <a:t> class object with ten nodes, and using it as a callable, we (fully) connect it to the </a:t>
+              <a:t> class object with ten nodes, and (fully) connect it to the </a:t>
             </a:r>
             <a:r>
               <a:rPr lang="en" sz="1200">
@@ -18375,7 +18518,7 @@
                   <a:schemeClr val="dk1"/>
                 </a:solidFill>
               </a:rPr>
-              <a:t> class object with one node, and using it as a callable, we (fully) connect it to the </a:t>
+              <a:t> class object with one node, and (fully) connect it to the </a:t>
             </a:r>
             <a:r>
               <a:rPr lang="en" sz="1200">
@@ -18465,7 +18608,7 @@
           <p:nvPr/>
         </p:nvGraphicFramePr>
         <p:xfrm>
-          <a:off x="938450" y="2787650"/>
+          <a:off x="938450" y="2728725"/>
           <a:ext cx="3000000" cy="3000000"/>
         </p:xfrm>
         <a:graphic>
@@ -18473,12 +18616,12 @@
             <a:tbl>
               <a:tblPr>
                 <a:noFill/>
-                <a:tableStyleId>{FCAAA6F9-5CDA-4634-9557-80530CD96CF1}</a:tableStyleId>
+                <a:tableStyleId>{598113E7-8056-45F2-96DC-6926265A21D5}</a:tableStyleId>
               </a:tblPr>
               <a:tblGrid>
                 <a:gridCol w="7070100"/>
               </a:tblGrid>
-              <a:tr h="12700">
+              <a:tr h="2414775">
                 <a:tc>
                   <a:txBody>
                     <a:bodyPr/>
@@ -19724,7 +19867,7 @@
                   <a:schemeClr val="dk1"/>
                 </a:solidFill>
               </a:rPr>
-              <a:t>When training or predicting (inference), each node in a layer will output a value to the nodes in the next layer. We don't want to pass the value 'as-is', but instead we want to change the value by some manner. This process is called an activation function. Think of a function that returns some result, like </a:t>
+              <a:t>When training or predicting (inference), each node in a layer will output a value to the nodes in the next layer. We don't pass the value 'as-is'. Instead we want to change the value by some manner. This process is called an activation function. Think of a function that returns some result, like </a:t>
             </a:r>
             <a:r>
               <a:rPr lang="en" sz="1200">
@@ -20715,51 +20858,7 @@
                   <a:srgbClr val="FFFFFF"/>
                 </a:highlight>
               </a:rPr>
-              <a:t>The rectified linear unit is generally used between layers. In our example, we will add a rectified linear unit between each layer.</a:t>
-            </a:r>
-            <a:endParaRPr sz="1200">
-              <a:solidFill>
-                <a:schemeClr val="dk1"/>
-              </a:solidFill>
-            </a:endParaRPr>
-          </a:p>
-          <a:p>
-            <a:pPr indent="0" lvl="0" marL="0" rtl="0" algn="l">
-              <a:lnSpc>
-                <a:spcPct val="115000"/>
-              </a:lnSpc>
-              <a:spcBef>
-                <a:spcPts val="1100"/>
-              </a:spcBef>
-              <a:spcAft>
-                <a:spcPts val="0"/>
-              </a:spcAft>
-              <a:buNone/>
-            </a:pPr>
-            <a:r>
-              <a:t/>
-            </a:r>
-            <a:endParaRPr sz="1200">
-              <a:solidFill>
-                <a:schemeClr val="dk1"/>
-              </a:solidFill>
-            </a:endParaRPr>
-          </a:p>
-          <a:p>
-            <a:pPr indent="0" lvl="0" marL="0" rtl="0" algn="l">
-              <a:lnSpc>
-                <a:spcPct val="115000"/>
-              </a:lnSpc>
-              <a:spcBef>
-                <a:spcPts val="1100"/>
-              </a:spcBef>
-              <a:spcAft>
-                <a:spcPts val="0"/>
-              </a:spcAft>
-              <a:buNone/>
-            </a:pPr>
-            <a:r>
-              <a:t/>
+              <a:t>The rectified linear unit is common convention between layers. </a:t>
             </a:r>
             <a:endParaRPr sz="1200">
               <a:solidFill>
@@ -20938,7 +21037,7 @@
             <a:tbl>
               <a:tblPr>
                 <a:noFill/>
-                <a:tableStyleId>{FCAAA6F9-5CDA-4634-9557-80530CD96CF1}</a:tableStyleId>
+                <a:tableStyleId>{598113E7-8056-45F2-96DC-6926265A21D5}</a:tableStyleId>
               </a:tblPr>
               <a:tblGrid>
                 <a:gridCol w="7388325"/>
@@ -22650,7 +22749,7 @@
             <a:tbl>
               <a:tblPr>
                 <a:noFill/>
-                <a:tableStyleId>{FCAAA6F9-5CDA-4634-9557-80530CD96CF1}</a:tableStyleId>
+                <a:tableStyleId>{598113E7-8056-45F2-96DC-6926265A21D5}</a:tableStyleId>
               </a:tblPr>
               <a:tblGrid>
                 <a:gridCol w="1905000"/>
@@ -22764,7 +22863,7 @@
             <a:tbl>
               <a:tblPr>
                 <a:noFill/>
-                <a:tableStyleId>{FCAAA6F9-5CDA-4634-9557-80530CD96CF1}</a:tableStyleId>
+                <a:tableStyleId>{598113E7-8056-45F2-96DC-6926265A21D5}</a:tableStyleId>
               </a:tblPr>
               <a:tblGrid>
                 <a:gridCol w="7676925"/>
@@ -24802,7 +24901,7 @@
                   <a:srgbClr val="FFFFFF"/>
                 </a:highlight>
               </a:rPr>
-              <a:t>Let's look at the parameter field in the summary. See how for the input layer it shows 140 parameters. You wonder how's that calculated. We have 13 inputs and 10 nodes, so </a:t>
+              <a:t>Let's look at the parameter field in the summary. For the input layer it shows 140 parameters. You wonder how's that calculated? We have 13 inputs and 10 nodes, so </a:t>
             </a:r>
             <a:r>
               <a:rPr b="1" lang="en" sz="1200">
@@ -25372,7 +25471,7 @@
                   <a:srgbClr val="FFFFFF"/>
                 </a:highlight>
               </a:rPr>
-              <a:t> provides a shorthand syntax when specifying layers. You don't actually need to separately specify activation functions between layers, as we did above. Instead, you can specify the </a:t>
+              <a:t> provides a shorthand syntax when specifying layers. You don't need to separately specify activation functions between layers. Instead, you can specify the </a:t>
             </a:r>
             <a:r>
               <a:rPr b="1" lang="en" sz="1200">
@@ -25697,7 +25796,7 @@
             <a:tbl>
               <a:tblPr>
                 <a:noFill/>
-                <a:tableStyleId>{FCAAA6F9-5CDA-4634-9557-80530CD96CF1}</a:tableStyleId>
+                <a:tableStyleId>{598113E7-8056-45F2-96DC-6926265A21D5}</a:tableStyleId>
               </a:tblPr>
               <a:tblGrid>
                 <a:gridCol w="7070100"/>
@@ -26921,7 +27020,7 @@
                   <a:srgbClr val="FFFFFF"/>
                 </a:highlight>
               </a:rPr>
-              <a:t>Once you've completed building the forward feed portion of your neural network, as we have for our simple example, we now need to add a few things for training the model. This is done with the </a:t>
+              <a:t>Once you've completed building the forward feed portion of your neural network, you now need to add a few things for training the model. This is done with the </a:t>
             </a:r>
             <a:r>
               <a:rPr b="1" lang="en" sz="1200">
@@ -28798,7 +28897,7 @@
             <a:tbl>
               <a:tblPr>
                 <a:noFill/>
-                <a:tableStyleId>{FCAAA6F9-5CDA-4634-9557-80530CD96CF1}</a:tableStyleId>
+                <a:tableStyleId>{598113E7-8056-45F2-96DC-6926265A21D5}</a:tableStyleId>
               </a:tblPr>
               <a:tblGrid>
                 <a:gridCol w="7141525"/>
@@ -29625,7 +29724,7 @@
                   <a:srgbClr val="FFFFFF"/>
                 </a:highlight>
               </a:rPr>
-              <a:t>We will now code this in several different styles. Let's start by taking our previous code example, where we specify the activation function as a (keyword) parameter. In this example, we add to the output </a:t>
+              <a:t>Let's start by taking our previous code example, where we specify the activation function as a (keyword) parameter. In this example, we add to the output </a:t>
             </a:r>
             <a:r>
               <a:rPr lang="en" sz="1200">
@@ -29953,7 +30052,7 @@
             <a:tbl>
               <a:tblPr>
                 <a:noFill/>
-                <a:tableStyleId>{FCAAA6F9-5CDA-4634-9557-80530CD96CF1}</a:tableStyleId>
+                <a:tableStyleId>{598113E7-8056-45F2-96DC-6926265A21D5}</a:tableStyleId>
               </a:tblPr>
               <a:tblGrid>
                 <a:gridCol w="7431500"/>
@@ -31571,7 +31670,7 @@
                   <a:srgbClr val="FFFFFF"/>
                 </a:highlight>
               </a:rPr>
-              <a:t>We will rewrite the same code using the layers approach. </a:t>
+              <a:t>We will rewrite the same code using the Functional API approach. </a:t>
             </a:r>
             <a:r>
               <a:rPr b="1" lang="en" sz="1200">
@@ -31764,7 +31863,7 @@
             <a:tbl>
               <a:tblPr>
                 <a:noFill/>
-                <a:tableStyleId>{FCAAA6F9-5CDA-4634-9557-80530CD96CF1}</a:tableStyleId>
+                <a:tableStyleId>{598113E7-8056-45F2-96DC-6926265A21D5}</a:tableStyleId>
               </a:tblPr>
               <a:tblGrid>
                 <a:gridCol w="8602500"/>
@@ -33775,7 +33874,7 @@
                   <a:srgbClr val="FFFFFF"/>
                 </a:highlight>
               </a:rPr>
-              <a:t>We can already see we will have some problems. For example, men on average as adults are taller than women. But during the preteen years, girls tend to be taller than boys. We know on average that men get heavier early in their adult years in comparison to their teenage years, but women on average are less likely. So we should anticipate lots of problems in predicting around the preteen years for girls, teenage years for boys, and adult years for women.</a:t>
+              <a:t>We will have some problems. For example, men on average as adults are taller than women. But during the preteen years, girls tend to be taller than boys. We know on average that men get heavier early in their adult years in comparison to their teenage years, but women on average are less likely. So we should anticipate lots of problems in predicting around the preteen years for girls, teenage years for boys, and adult years for women.</a:t>
             </a:r>
             <a:endParaRPr sz="1200">
               <a:solidFill>
@@ -34714,7 +34813,7 @@
             <a:tbl>
               <a:tblPr>
                 <a:noFill/>
-                <a:tableStyleId>{FCAAA6F9-5CDA-4634-9557-80530CD96CF1}</a:tableStyleId>
+                <a:tableStyleId>{598113E7-8056-45F2-96DC-6926265A21D5}</a:tableStyleId>
               </a:tblPr>
               <a:tblGrid>
                 <a:gridCol w="8274200"/>
@@ -36308,7 +36407,7 @@
                   <a:srgbClr val="FFFFFF"/>
                 </a:highlight>
               </a:rPr>
-              <a:t>Using neural networks for image classification is now used throughout computer vision. For small size "gray scale" images, we can use a DNN similar to what we have already described. This type of DNN has been widely published in use of the MNIST dataset; which is a dataset for recognizing handwritten digits. The dataset consists of grayscale images of size 28 x 28 pixels.</a:t>
+              <a:t>For small size "gray scale" images, we can use a DNN. This type of DNN has been widely published in use of the MNIST dataset; which is a dataset for recognizing handwritten digits. The dataset consists of grayscale images of size 28 x 28 pixels.</a:t>
             </a:r>
             <a:endParaRPr sz="1200">
               <a:solidFill>
@@ -36341,7 +36440,7 @@
                   <a:srgbClr val="FFFFFF"/>
                 </a:highlight>
               </a:rPr>
-              <a:t>We will need to make one change though. A grayscale image is a matrix (2D array). Think of them as a grid, sized height x width, where the width are the columns and the height are the rows. A DNN though takes as input a vector (1D array). </a:t>
+              <a:t>We will need to make one change. A grayscale image is a matrix (2D array). Think of them as a grid, sized height x width, where the width are the columns and the height are the rows. A DNN though takes as input a vector (1D array). </a:t>
             </a:r>
             <a:endParaRPr sz="1200">
               <a:solidFill>
@@ -37487,7 +37586,7 @@
             <a:tbl>
               <a:tblPr>
                 <a:noFill/>
-                <a:tableStyleId>{FCAAA6F9-5CDA-4634-9557-80530CD96CF1}</a:tableStyleId>
+                <a:tableStyleId>{598113E7-8056-45F2-96DC-6926265A21D5}</a:tableStyleId>
               </a:tblPr>
               <a:tblGrid>
                 <a:gridCol w="7885700"/>
@@ -39593,7 +39692,7 @@
                   <a:srgbClr val="FFFFFF"/>
                 </a:highlight>
               </a:rPr>
-              <a:t> method. As you can see, the first layer in the summary is the flattened layer and shows that the output from the layer is 784 nodes. That's what we want. Also notice how many parameters the network will need to </a:t>
+              <a:t> method. The first layer in the summary is the flattened layer and shows that the output from the layer is 784 nodes. Also notice how many parameters the network will need to </a:t>
             </a:r>
             <a:r>
               <a:rPr i="1" lang="en" sz="1200">
@@ -39690,7 +39789,7 @@
             <a:tbl>
               <a:tblPr>
                 <a:noFill/>
-                <a:tableStyleId>{FCAAA6F9-5CDA-4634-9557-80530CD96CF1}</a:tableStyleId>
+                <a:tableStyleId>{598113E7-8056-45F2-96DC-6926265A21D5}</a:tableStyleId>
               </a:tblPr>
               <a:tblGrid>
                 <a:gridCol w="8099075"/>
@@ -43043,7 +43142,7 @@
             <a:tbl>
               <a:tblPr>
                 <a:noFill/>
-                <a:tableStyleId>{FCAAA6F9-5CDA-4634-9557-80530CD96CF1}</a:tableStyleId>
+                <a:tableStyleId>{598113E7-8056-45F2-96DC-6926265A21D5}</a:tableStyleId>
               </a:tblPr>
               <a:tblGrid>
                 <a:gridCol w="8326650"/>
@@ -45082,7 +45181,7 @@
                   <a:schemeClr val="dk1"/>
                 </a:solidFill>
               </a:rPr>
-              <a:t>I assume you have Python installed (preferably version 3). Whether you directly installed it, or it got installed as part of a larger package, like Anaconda, you got with it a nifty command like tool called </a:t>
+              <a:t>The </a:t>
             </a:r>
             <a:r>
               <a:rPr lang="en" sz="1200">
@@ -45101,7 +45200,7 @@
                   <a:schemeClr val="dk1"/>
                 </a:solidFill>
               </a:rPr>
-              <a:t>. This tool is used to install any Python package you will ever need again from a single command invocation. You go </a:t>
+              <a:t>  tool is used to install any Python package you will ever need again from a single command invocation. You go </a:t>
             </a:r>
             <a:r>
               <a:rPr lang="en" sz="1200">
@@ -45986,7 +46085,7 @@
                   <a:schemeClr val="dk1"/>
                 </a:solidFill>
               </a:rPr>
-              <a:t>The input layer to a neural network takes numbers! All the input data is converted to numbers. Everything is a number, text, speech, images, etc. </a:t>
+              <a:t>The input layer to a neural network takes numbers! </a:t>
             </a:r>
             <a:endParaRPr sz="1200">
               <a:solidFill>
@@ -46339,7 +46438,7 @@
                   <a:schemeClr val="dk1"/>
                 </a:solidFill>
               </a:rPr>
-              <a:t>We instantiate an </a:t>
+              <a:t>For the </a:t>
             </a:r>
             <a:r>
               <a:rPr lang="en" sz="1200">
@@ -46358,7 +46457,7 @@
                   <a:schemeClr val="dk1"/>
                 </a:solidFill>
               </a:rPr>
-              <a:t> class object. For this class object, we define the shape (i.e., dimensions) of the input. In our example, the input is a one dimensional array (i.e., vector) of 13 elements, one for each feature.</a:t>
+              <a:t> class object, we define the shape (i.e., dimensions) of the input. In our example, the input is a one dimensional array (i.e., vector) of 13 elements, one for each feature.</a:t>
             </a:r>
             <a:endParaRPr sz="1200">
               <a:solidFill>
@@ -46456,7 +46555,7 @@
             <a:tbl>
               <a:tblPr>
                 <a:noFill/>
-                <a:tableStyleId>{FCAAA6F9-5CDA-4634-9557-80530CD96CF1}</a:tableStyleId>
+                <a:tableStyleId>{598113E7-8056-45F2-96DC-6926265A21D5}</a:tableStyleId>
               </a:tblPr>
               <a:tblGrid>
                 <a:gridCol w="4066375"/>
@@ -47024,7 +47123,7 @@
                   <a:schemeClr val="dk1"/>
                 </a:solidFill>
               </a:rPr>
-              <a:t> evaluates to. It produces a tensor object by the name 'input_1:0'. This name will be useful later in assisting you in debugging your models. </a:t>
+              <a:t> evaluates to. It produces a tensor object by the name 'input_1:0'. This name will be useful in assisting you in debugging. </a:t>
             </a:r>
             <a:endParaRPr sz="1200">
               <a:solidFill>

</xml_diff>

<commit_message>
fix sigmoid should be softmax in multi-class classifier
</commit_message>
<xml_diff>
--- a/workshops/Neural_Networks/The Idiomatic Programmer - Learning Keras - Workshop - Neural Networks.pptx
+++ b/workshops/Neural_Networks/The Idiomatic Programmer - Learning Keras - Workshop - Neural Networks.pptx
@@ -9875,7 +9875,7 @@
                   <a:srgbClr val="38761D"/>
                 </a:solidFill>
               </a:rPr>
-              <a:t>ersion: July 2019</a:t>
+              <a:t>ersion: August 2019</a:t>
             </a:r>
             <a:endParaRPr sz="1200">
               <a:solidFill>
@@ -11257,7 +11257,7 @@
             <a:tbl>
               <a:tblPr>
                 <a:noFill/>
-                <a:tableStyleId>{8FD888ED-ED0D-4A22-A0BC-D6BD2AB562DC}</a:tableStyleId>
+                <a:tableStyleId>{F256099A-DD11-47A7-8DFB-066696DDA95B}</a:tableStyleId>
               </a:tblPr>
               <a:tblGrid>
                 <a:gridCol w="4214100"/>
@@ -12075,7 +12075,7 @@
             <a:tbl>
               <a:tblPr>
                 <a:noFill/>
-                <a:tableStyleId>{8FD888ED-ED0D-4A22-A0BC-D6BD2AB562DC}</a:tableStyleId>
+                <a:tableStyleId>{F256099A-DD11-47A7-8DFB-066696DDA95B}</a:tableStyleId>
               </a:tblPr>
               <a:tblGrid>
                 <a:gridCol w="4214100"/>
@@ -12614,7 +12614,7 @@
             <a:tbl>
               <a:tblPr>
                 <a:noFill/>
-                <a:tableStyleId>{8FD888ED-ED0D-4A22-A0BC-D6BD2AB562DC}</a:tableStyleId>
+                <a:tableStyleId>{F256099A-DD11-47A7-8DFB-066696DDA95B}</a:tableStyleId>
               </a:tblPr>
               <a:tblGrid>
                 <a:gridCol w="5921325"/>
@@ -14606,7 +14606,7 @@
             <a:tbl>
               <a:tblPr>
                 <a:noFill/>
-                <a:tableStyleId>{8FD888ED-ED0D-4A22-A0BC-D6BD2AB562DC}</a:tableStyleId>
+                <a:tableStyleId>{F256099A-DD11-47A7-8DFB-066696DDA95B}</a:tableStyleId>
               </a:tblPr>
               <a:tblGrid>
                 <a:gridCol w="7136025"/>
@@ -15618,7 +15618,7 @@
             <a:tbl>
               <a:tblPr>
                 <a:noFill/>
-                <a:tableStyleId>{8FD888ED-ED0D-4A22-A0BC-D6BD2AB562DC}</a:tableStyleId>
+                <a:tableStyleId>{F256099A-DD11-47A7-8DFB-066696DDA95B}</a:tableStyleId>
               </a:tblPr>
               <a:tblGrid>
                 <a:gridCol w="7136025"/>
@@ -16945,7 +16945,7 @@
             <a:tbl>
               <a:tblPr>
                 <a:noFill/>
-                <a:tableStyleId>{8FD888ED-ED0D-4A22-A0BC-D6BD2AB562DC}</a:tableStyleId>
+                <a:tableStyleId>{F256099A-DD11-47A7-8DFB-066696DDA95B}</a:tableStyleId>
               </a:tblPr>
               <a:tblGrid>
                 <a:gridCol w="5248275"/>
@@ -17665,7 +17665,7 @@
             <a:tbl>
               <a:tblPr>
                 <a:noFill/>
-                <a:tableStyleId>{8FD888ED-ED0D-4A22-A0BC-D6BD2AB562DC}</a:tableStyleId>
+                <a:tableStyleId>{F256099A-DD11-47A7-8DFB-066696DDA95B}</a:tableStyleId>
               </a:tblPr>
               <a:tblGrid>
                 <a:gridCol w="7070100"/>
@@ -18616,7 +18616,7 @@
             <a:tbl>
               <a:tblPr>
                 <a:noFill/>
-                <a:tableStyleId>{8FD888ED-ED0D-4A22-A0BC-D6BD2AB562DC}</a:tableStyleId>
+                <a:tableStyleId>{F256099A-DD11-47A7-8DFB-066696DDA95B}</a:tableStyleId>
               </a:tblPr>
               <a:tblGrid>
                 <a:gridCol w="7070100"/>
@@ -21037,7 +21037,7 @@
             <a:tbl>
               <a:tblPr>
                 <a:noFill/>
-                <a:tableStyleId>{8FD888ED-ED0D-4A22-A0BC-D6BD2AB562DC}</a:tableStyleId>
+                <a:tableStyleId>{F256099A-DD11-47A7-8DFB-066696DDA95B}</a:tableStyleId>
               </a:tblPr>
               <a:tblGrid>
                 <a:gridCol w="7388325"/>
@@ -22749,7 +22749,7 @@
             <a:tbl>
               <a:tblPr>
                 <a:noFill/>
-                <a:tableStyleId>{8FD888ED-ED0D-4A22-A0BC-D6BD2AB562DC}</a:tableStyleId>
+                <a:tableStyleId>{F256099A-DD11-47A7-8DFB-066696DDA95B}</a:tableStyleId>
               </a:tblPr>
               <a:tblGrid>
                 <a:gridCol w="1905000"/>
@@ -22863,7 +22863,7 @@
             <a:tbl>
               <a:tblPr>
                 <a:noFill/>
-                <a:tableStyleId>{8FD888ED-ED0D-4A22-A0BC-D6BD2AB562DC}</a:tableStyleId>
+                <a:tableStyleId>{F256099A-DD11-47A7-8DFB-066696DDA95B}</a:tableStyleId>
               </a:tblPr>
               <a:tblGrid>
                 <a:gridCol w="7676925"/>
@@ -25796,7 +25796,7 @@
             <a:tbl>
               <a:tblPr>
                 <a:noFill/>
-                <a:tableStyleId>{8FD888ED-ED0D-4A22-A0BC-D6BD2AB562DC}</a:tableStyleId>
+                <a:tableStyleId>{F256099A-DD11-47A7-8DFB-066696DDA95B}</a:tableStyleId>
               </a:tblPr>
               <a:tblGrid>
                 <a:gridCol w="7070100"/>
@@ -28897,7 +28897,7 @@
             <a:tbl>
               <a:tblPr>
                 <a:noFill/>
-                <a:tableStyleId>{8FD888ED-ED0D-4A22-A0BC-D6BD2AB562DC}</a:tableStyleId>
+                <a:tableStyleId>{F256099A-DD11-47A7-8DFB-066696DDA95B}</a:tableStyleId>
               </a:tblPr>
               <a:tblGrid>
                 <a:gridCol w="7141525"/>
@@ -30052,7 +30052,7 @@
             <a:tbl>
               <a:tblPr>
                 <a:noFill/>
-                <a:tableStyleId>{8FD888ED-ED0D-4A22-A0BC-D6BD2AB562DC}</a:tableStyleId>
+                <a:tableStyleId>{F256099A-DD11-47A7-8DFB-066696DDA95B}</a:tableStyleId>
               </a:tblPr>
               <a:tblGrid>
                 <a:gridCol w="7431500"/>
@@ -31863,7 +31863,7 @@
             <a:tbl>
               <a:tblPr>
                 <a:noFill/>
-                <a:tableStyleId>{8FD888ED-ED0D-4A22-A0BC-D6BD2AB562DC}</a:tableStyleId>
+                <a:tableStyleId>{F256099A-DD11-47A7-8DFB-066696DDA95B}</a:tableStyleId>
               </a:tblPr>
               <a:tblGrid>
                 <a:gridCol w="8602500"/>
@@ -34813,7 +34813,7 @@
             <a:tbl>
               <a:tblPr>
                 <a:noFill/>
-                <a:tableStyleId>{8FD888ED-ED0D-4A22-A0BC-D6BD2AB562DC}</a:tableStyleId>
+                <a:tableStyleId>{F256099A-DD11-47A7-8DFB-066696DDA95B}</a:tableStyleId>
               </a:tblPr>
               <a:tblGrid>
                 <a:gridCol w="8274200"/>
@@ -37586,7 +37586,7 @@
             <a:tbl>
               <a:tblPr>
                 <a:noFill/>
-                <a:tableStyleId>{8FD888ED-ED0D-4A22-A0BC-D6BD2AB562DC}</a:tableStyleId>
+                <a:tableStyleId>{F256099A-DD11-47A7-8DFB-066696DDA95B}</a:tableStyleId>
               </a:tblPr>
               <a:tblGrid>
                 <a:gridCol w="7885700"/>
@@ -39132,7 +39132,7 @@
                           <a:cs typeface="Consolas"/>
                           <a:sym typeface="Consolas"/>
                         </a:rPr>
-                        <a:t>'sigmoid'</a:t>
+                        <a:t>'softmax'</a:t>
                       </a:r>
                       <a:r>
                         <a:rPr lang="en" sz="1000">
@@ -39789,7 +39789,7 @@
             <a:tbl>
               <a:tblPr>
                 <a:noFill/>
-                <a:tableStyleId>{8FD888ED-ED0D-4A22-A0BC-D6BD2AB562DC}</a:tableStyleId>
+                <a:tableStyleId>{F256099A-DD11-47A7-8DFB-066696DDA95B}</a:tableStyleId>
               </a:tblPr>
               <a:tblGrid>
                 <a:gridCol w="8099075"/>
@@ -43142,7 +43142,7 @@
             <a:tbl>
               <a:tblPr>
                 <a:noFill/>
-                <a:tableStyleId>{8FD888ED-ED0D-4A22-A0BC-D6BD2AB562DC}</a:tableStyleId>
+                <a:tableStyleId>{F256099A-DD11-47A7-8DFB-066696DDA95B}</a:tableStyleId>
               </a:tblPr>
               <a:tblGrid>
                 <a:gridCol w="8326650"/>
@@ -46555,7 +46555,7 @@
             <a:tbl>
               <a:tblPr>
                 <a:noFill/>
-                <a:tableStyleId>{8FD888ED-ED0D-4A22-A0BC-D6BD2AB562DC}</a:tableStyleId>
+                <a:tableStyleId>{F256099A-DD11-47A7-8DFB-066696DDA95B}</a:tableStyleId>
               </a:tblPr>
               <a:tblGrid>
                 <a:gridCol w="4066375"/>

</xml_diff>